<commit_message>
fin du projet repart
</commit_message>
<xml_diff>
--- a/Présentation Repart.pptx
+++ b/Présentation Repart.pptx
@@ -5,7 +5,7 @@
     <p:sldMasterId id="2147483648" r:id="rId1"/>
   </p:sldMasterIdLst>
   <p:notesMasterIdLst>
-    <p:notesMasterId r:id="rId13"/>
+    <p:notesMasterId r:id="rId15"/>
   </p:notesMasterIdLst>
   <p:sldIdLst>
     <p:sldId id="256" r:id="rId2"/>
@@ -18,7 +18,9 @@
     <p:sldId id="263" r:id="rId9"/>
     <p:sldId id="264" r:id="rId10"/>
     <p:sldId id="265" r:id="rId11"/>
-    <p:sldId id="266" r:id="rId12"/>
+    <p:sldId id="267" r:id="rId12"/>
+    <p:sldId id="266" r:id="rId13"/>
+    <p:sldId id="268" r:id="rId14"/>
   </p:sldIdLst>
   <p:sldSz cx="12192000" cy="6858000"/>
   <p:notesSz cx="6858000" cy="9144000"/>
@@ -3758,10 +3760,10 @@
       </p:sp>
       <p:pic>
         <p:nvPicPr>
-          <p:cNvPr id="5" name="Image 4">
-            <a:extLst>
-              <a:ext uri="{FF2B5EF4-FFF2-40B4-BE49-F238E27FC236}">
-                <a16:creationId xmlns:a16="http://schemas.microsoft.com/office/drawing/2014/main" id="{4594C4DF-7C55-7736-42BC-AA3A65F45F78}"/>
+          <p:cNvPr id="6" name="Image 5">
+            <a:extLst>
+              <a:ext uri="{FF2B5EF4-FFF2-40B4-BE49-F238E27FC236}">
+                <a16:creationId xmlns:a16="http://schemas.microsoft.com/office/drawing/2014/main" id="{B075D051-4BC3-93F4-5187-D42BB57A3969}"/>
               </a:ext>
             </a:extLst>
           </p:cNvPr>
@@ -3778,20 +3780,89 @@
         </p:blipFill>
         <p:spPr>
           <a:xfrm>
-            <a:off x="0" y="0"/>
-            <a:ext cx="6235700" cy="1295400"/>
+            <a:off x="4615927" y="1771864"/>
+            <a:ext cx="2960146" cy="2433898"/>
           </a:xfrm>
           <a:prstGeom prst="rect">
             <a:avLst/>
           </a:prstGeom>
         </p:spPr>
       </p:pic>
+      <p:sp>
+        <p:nvSpPr>
+          <p:cNvPr id="9" name="Espace réservé du numéro de diapositive 8">
+            <a:extLst>
+              <a:ext uri="{FF2B5EF4-FFF2-40B4-BE49-F238E27FC236}">
+                <a16:creationId xmlns:a16="http://schemas.microsoft.com/office/drawing/2014/main" id="{40D4F0B2-9E0C-C9E4-00D9-8CC9151CE534}"/>
+              </a:ext>
+            </a:extLst>
+          </p:cNvPr>
+          <p:cNvSpPr>
+            <a:spLocks noGrp="1"/>
+          </p:cNvSpPr>
+          <p:nvPr>
+            <p:ph type="sldNum" sz="quarter" idx="12"/>
+          </p:nvPr>
+        </p:nvSpPr>
+        <p:spPr/>
+        <p:txBody>
+          <a:bodyPr/>
+          <a:lstStyle/>
+          <a:p>
+            <a:fld id="{7A576E13-A1CA-3747-80EE-E6E0D12CE74D}" type="slidenum">
+              <a:rPr lang="fr-FR" smtClean="0"/>
+              <a:t>1</a:t>
+            </a:fld>
+            <a:endParaRPr lang="fr-FR"/>
+          </a:p>
+        </p:txBody>
+      </p:sp>
+      <p:sp>
+        <p:nvSpPr>
+          <p:cNvPr id="2" name="ZoneTexte 1">
+            <a:extLst>
+              <a:ext uri="{FF2B5EF4-FFF2-40B4-BE49-F238E27FC236}">
+                <a16:creationId xmlns:a16="http://schemas.microsoft.com/office/drawing/2014/main" id="{9AF7853D-8A48-4110-F95C-B7366627BE6B}"/>
+              </a:ext>
+            </a:extLst>
+          </p:cNvPr>
+          <p:cNvSpPr txBox="1"/>
+          <p:nvPr/>
+        </p:nvSpPr>
+        <p:spPr>
+          <a:xfrm>
+            <a:off x="5168152" y="4021096"/>
+            <a:ext cx="1855695" cy="369332"/>
+          </a:xfrm>
+          <a:prstGeom prst="rect">
+            <a:avLst/>
+          </a:prstGeom>
+          <a:noFill/>
+        </p:spPr>
+        <p:txBody>
+          <a:bodyPr wrap="square" rtlCol="0">
+            <a:spAutoFit/>
+          </a:bodyPr>
+          <a:lstStyle/>
+          <a:p>
+            <a:r>
+              <a:rPr lang="fr-FR" dirty="0"/>
+              <a:t>Par </a:t>
+            </a:r>
+            <a:r>
+              <a:rPr lang="fr-FR" dirty="0" err="1"/>
+              <a:t>LesBGduNord</a:t>
+            </a:r>
+            <a:endParaRPr lang="fr-FR" dirty="0"/>
+          </a:p>
+        </p:txBody>
+      </p:sp>
       <p:pic>
         <p:nvPicPr>
-          <p:cNvPr id="6" name="Image 5">
-            <a:extLst>
-              <a:ext uri="{FF2B5EF4-FFF2-40B4-BE49-F238E27FC236}">
-                <a16:creationId xmlns:a16="http://schemas.microsoft.com/office/drawing/2014/main" id="{B075D051-4BC3-93F4-5187-D42BB57A3969}"/>
+          <p:cNvPr id="7" name="Image 6">
+            <a:extLst>
+              <a:ext uri="{FF2B5EF4-FFF2-40B4-BE49-F238E27FC236}">
+                <a16:creationId xmlns:a16="http://schemas.microsoft.com/office/drawing/2014/main" id="{5C789B2F-F16A-E833-ABBB-B98530D50EA8}"/>
               </a:ext>
             </a:extLst>
           </p:cNvPr>
@@ -3808,43 +3879,44 @@
         </p:blipFill>
         <p:spPr>
           <a:xfrm>
-            <a:off x="4615927" y="1771864"/>
-            <a:ext cx="2960146" cy="2433898"/>
+            <a:off x="8068389" y="136525"/>
+            <a:ext cx="4123611" cy="1771864"/>
           </a:xfrm>
           <a:prstGeom prst="rect">
             <a:avLst/>
           </a:prstGeom>
         </p:spPr>
       </p:pic>
-      <p:sp>
-        <p:nvSpPr>
-          <p:cNvPr id="9" name="Espace réservé du numéro de diapositive 8">
-            <a:extLst>
-              <a:ext uri="{FF2B5EF4-FFF2-40B4-BE49-F238E27FC236}">
-                <a16:creationId xmlns:a16="http://schemas.microsoft.com/office/drawing/2014/main" id="{40D4F0B2-9E0C-C9E4-00D9-8CC9151CE534}"/>
-              </a:ext>
-            </a:extLst>
-          </p:cNvPr>
-          <p:cNvSpPr>
-            <a:spLocks noGrp="1"/>
-          </p:cNvSpPr>
-          <p:nvPr>
-            <p:ph type="sldNum" sz="quarter" idx="12"/>
-          </p:nvPr>
-        </p:nvSpPr>
-        <p:spPr/>
-        <p:txBody>
-          <a:bodyPr/>
-          <a:lstStyle/>
-          <a:p>
-            <a:fld id="{7A576E13-A1CA-3747-80EE-E6E0D12CE74D}" type="slidenum">
-              <a:rPr lang="fr-FR" smtClean="0"/>
-              <a:t>1</a:t>
-            </a:fld>
-            <a:endParaRPr lang="fr-FR"/>
-          </a:p>
-        </p:txBody>
-      </p:sp>
+      <p:pic>
+        <p:nvPicPr>
+          <p:cNvPr id="10" name="Image 9">
+            <a:extLst>
+              <a:ext uri="{FF2B5EF4-FFF2-40B4-BE49-F238E27FC236}">
+                <a16:creationId xmlns:a16="http://schemas.microsoft.com/office/drawing/2014/main" id="{0C35189B-1040-1340-3C5D-34C3CFCB4CC8}"/>
+              </a:ext>
+            </a:extLst>
+          </p:cNvPr>
+          <p:cNvPicPr>
+            <a:picLocks noChangeAspect="1"/>
+          </p:cNvPicPr>
+          <p:nvPr/>
+        </p:nvPicPr>
+        <p:blipFill>
+          <a:blip r:embed="rId4"/>
+          <a:stretch>
+            <a:fillRect/>
+          </a:stretch>
+        </p:blipFill>
+        <p:spPr>
+          <a:xfrm>
+            <a:off x="0" y="0"/>
+            <a:ext cx="4940300" cy="1828800"/>
+          </a:xfrm>
+          <a:prstGeom prst="rect">
+            <a:avLst/>
+          </a:prstGeom>
+        </p:spPr>
+      </p:pic>
     </p:spTree>
     <p:extLst>
       <p:ext uri="{BB962C8B-B14F-4D97-AF65-F5344CB8AC3E}">
@@ -3891,7 +3963,12 @@
             <p:ph type="title"/>
           </p:nvPr>
         </p:nvSpPr>
-        <p:spPr/>
+        <p:spPr>
+          <a:xfrm>
+            <a:off x="-129988" y="-398668"/>
+            <a:ext cx="10515600" cy="1325563"/>
+          </a:xfrm>
+        </p:spPr>
         <p:txBody>
           <a:bodyPr/>
           <a:lstStyle/>
@@ -3927,8 +4004,8 @@
         </p:blipFill>
         <p:spPr>
           <a:xfrm>
-            <a:off x="2818503" y="1724754"/>
-            <a:ext cx="6013525" cy="4768121"/>
+            <a:off x="2150633" y="648355"/>
+            <a:ext cx="7831567" cy="6209645"/>
           </a:xfrm>
         </p:spPr>
       </p:pic>
@@ -3996,7 +4073,7 @@
           <p:cNvPr id="2" name="Titre 1">
             <a:extLst>
               <a:ext uri="{FF2B5EF4-FFF2-40B4-BE49-F238E27FC236}">
-                <a16:creationId xmlns:a16="http://schemas.microsoft.com/office/drawing/2014/main" id="{BDD3483B-B470-D928-6AD4-6B554925B63F}"/>
+                <a16:creationId xmlns:a16="http://schemas.microsoft.com/office/drawing/2014/main" id="{EB3E0532-8ADF-9631-2B87-BD601CB6061B}"/>
               </a:ext>
             </a:extLst>
           </p:cNvPr>
@@ -4014,26 +4091,88 @@
           <a:p>
             <a:r>
               <a:rPr lang="fr-FR" dirty="0"/>
-              <a:t>Plan de financement</a:t>
+              <a:t>Maquette</a:t>
+            </a:r>
+          </a:p>
+        </p:txBody>
+      </p:sp>
+      <p:sp>
+        <p:nvSpPr>
+          <p:cNvPr id="4" name="Espace réservé du numéro de diapositive 3">
+            <a:extLst>
+              <a:ext uri="{FF2B5EF4-FFF2-40B4-BE49-F238E27FC236}">
+                <a16:creationId xmlns:a16="http://schemas.microsoft.com/office/drawing/2014/main" id="{7697963E-DEF3-D223-79E5-D2BD4A6DCECE}"/>
+              </a:ext>
+            </a:extLst>
+          </p:cNvPr>
+          <p:cNvSpPr>
+            <a:spLocks noGrp="1"/>
+          </p:cNvSpPr>
+          <p:nvPr>
+            <p:ph type="sldNum" sz="quarter" idx="12"/>
+          </p:nvPr>
+        </p:nvSpPr>
+        <p:spPr/>
+        <p:txBody>
+          <a:bodyPr/>
+          <a:lstStyle/>
+          <a:p>
+            <a:fld id="{7A576E13-A1CA-3747-80EE-E6E0D12CE74D}" type="slidenum">
+              <a:rPr lang="fr-FR" smtClean="0"/>
+              <a:t>11</a:t>
+            </a:fld>
+            <a:endParaRPr lang="fr-FR"/>
+          </a:p>
+        </p:txBody>
+      </p:sp>
+      <p:sp>
+        <p:nvSpPr>
+          <p:cNvPr id="5" name="ZoneTexte 4">
+            <a:extLst>
+              <a:ext uri="{FF2B5EF4-FFF2-40B4-BE49-F238E27FC236}">
+                <a16:creationId xmlns:a16="http://schemas.microsoft.com/office/drawing/2014/main" id="{C384D06A-39AB-E364-A4CE-799D790E6260}"/>
+              </a:ext>
+            </a:extLst>
+          </p:cNvPr>
+          <p:cNvSpPr txBox="1"/>
+          <p:nvPr/>
+        </p:nvSpPr>
+        <p:spPr>
+          <a:xfrm>
+            <a:off x="4212739" y="3244334"/>
+            <a:ext cx="3766521" cy="369332"/>
+          </a:xfrm>
+          <a:prstGeom prst="rect">
+            <a:avLst/>
+          </a:prstGeom>
+          <a:noFill/>
+        </p:spPr>
+        <p:txBody>
+          <a:bodyPr wrap="square" rtlCol="0">
+            <a:spAutoFit/>
+          </a:bodyPr>
+          <a:lstStyle/>
+          <a:p>
+            <a:r>
+              <a:rPr lang="fr-FR" dirty="0"/>
+              <a:t>Les maquettes sont présentées à part</a:t>
             </a:r>
           </a:p>
         </p:txBody>
       </p:sp>
       <p:pic>
         <p:nvPicPr>
-          <p:cNvPr id="5" name="Espace réservé du contenu 4">
-            <a:extLst>
-              <a:ext uri="{FF2B5EF4-FFF2-40B4-BE49-F238E27FC236}">
-                <a16:creationId xmlns:a16="http://schemas.microsoft.com/office/drawing/2014/main" id="{2692B497-7EA7-4123-9FFF-58489843DE45}"/>
+          <p:cNvPr id="7" name="Image 6">
+            <a:extLst>
+              <a:ext uri="{FF2B5EF4-FFF2-40B4-BE49-F238E27FC236}">
+                <a16:creationId xmlns:a16="http://schemas.microsoft.com/office/drawing/2014/main" id="{09AB2435-94E4-54E1-F6C0-61F76CF0DF63}"/>
               </a:ext>
             </a:extLst>
           </p:cNvPr>
           <p:cNvPicPr>
-            <a:picLocks noGrp="1" noChangeAspect="1"/>
+            <a:picLocks noChangeAspect="1"/>
           </p:cNvPicPr>
-          <p:nvPr>
-            <p:ph idx="1"/>
-          </p:nvPr>
+          <p:nvPr/>
         </p:nvPicPr>
         <p:blipFill>
           <a:blip r:embed="rId2"/>
@@ -4043,11 +4182,72 @@
         </p:blipFill>
         <p:spPr>
           <a:xfrm>
-            <a:off x="838200" y="2401862"/>
-            <a:ext cx="10515600" cy="3198863"/>
-          </a:xfrm>
+            <a:off x="1065007" y="2551796"/>
+            <a:ext cx="2123739" cy="2123739"/>
+          </a:xfrm>
+          <a:prstGeom prst="rect">
+            <a:avLst/>
+          </a:prstGeom>
         </p:spPr>
       </p:pic>
+    </p:spTree>
+    <p:extLst>
+      <p:ext uri="{BB962C8B-B14F-4D97-AF65-F5344CB8AC3E}">
+        <p14:creationId xmlns:p14="http://schemas.microsoft.com/office/powerpoint/2010/main" val="1972825472"/>
+      </p:ext>
+    </p:extLst>
+  </p:cSld>
+  <p:clrMapOvr>
+    <a:masterClrMapping/>
+  </p:clrMapOvr>
+</p:sld>
+</file>
+
+<file path=ppt/slides/slide12.xml><?xml version="1.0" encoding="utf-8"?>
+<p:sld xmlns:a="http://schemas.openxmlformats.org/drawingml/2006/main" xmlns:r="http://schemas.openxmlformats.org/officeDocument/2006/relationships" xmlns:p="http://schemas.openxmlformats.org/presentationml/2006/main">
+  <p:cSld>
+    <p:spTree>
+      <p:nvGrpSpPr>
+        <p:cNvPr id="1" name=""/>
+        <p:cNvGrpSpPr/>
+        <p:nvPr/>
+      </p:nvGrpSpPr>
+      <p:grpSpPr>
+        <a:xfrm>
+          <a:off x="0" y="0"/>
+          <a:ext cx="0" cy="0"/>
+          <a:chOff x="0" y="0"/>
+          <a:chExt cx="0" cy="0"/>
+        </a:xfrm>
+      </p:grpSpPr>
+      <p:sp>
+        <p:nvSpPr>
+          <p:cNvPr id="2" name="Titre 1">
+            <a:extLst>
+              <a:ext uri="{FF2B5EF4-FFF2-40B4-BE49-F238E27FC236}">
+                <a16:creationId xmlns:a16="http://schemas.microsoft.com/office/drawing/2014/main" id="{BDD3483B-B470-D928-6AD4-6B554925B63F}"/>
+              </a:ext>
+            </a:extLst>
+          </p:cNvPr>
+          <p:cNvSpPr>
+            <a:spLocks noGrp="1"/>
+          </p:cNvSpPr>
+          <p:nvPr>
+            <p:ph type="title"/>
+          </p:nvPr>
+        </p:nvSpPr>
+        <p:spPr/>
+        <p:txBody>
+          <a:bodyPr/>
+          <a:lstStyle/>
+          <a:p>
+            <a:r>
+              <a:rPr lang="fr-FR" dirty="0"/>
+              <a:t>Plan de financement</a:t>
+            </a:r>
+          </a:p>
+        </p:txBody>
+      </p:sp>
       <p:sp>
         <p:nvSpPr>
           <p:cNvPr id="3" name="Espace réservé du numéro de diapositive 2">
@@ -4071,16 +4271,169 @@
           <a:p>
             <a:fld id="{7A576E13-A1CA-3747-80EE-E6E0D12CE74D}" type="slidenum">
               <a:rPr lang="fr-FR" smtClean="0"/>
-              <a:t>11</a:t>
+              <a:t>12</a:t>
             </a:fld>
             <a:endParaRPr lang="fr-FR"/>
           </a:p>
         </p:txBody>
       </p:sp>
+      <p:pic>
+        <p:nvPicPr>
+          <p:cNvPr id="12" name="Espace réservé du contenu 11">
+            <a:extLst>
+              <a:ext uri="{FF2B5EF4-FFF2-40B4-BE49-F238E27FC236}">
+                <a16:creationId xmlns:a16="http://schemas.microsoft.com/office/drawing/2014/main" id="{89456E07-16E8-2B3D-FB41-E283076B66FA}"/>
+              </a:ext>
+            </a:extLst>
+          </p:cNvPr>
+          <p:cNvPicPr>
+            <a:picLocks noGrp="1" noChangeAspect="1"/>
+          </p:cNvPicPr>
+          <p:nvPr>
+            <p:ph idx="1"/>
+          </p:nvPr>
+        </p:nvPicPr>
+        <p:blipFill>
+          <a:blip r:embed="rId2"/>
+          <a:stretch>
+            <a:fillRect/>
+          </a:stretch>
+        </p:blipFill>
+        <p:spPr>
+          <a:xfrm>
+            <a:off x="336446" y="2310153"/>
+            <a:ext cx="11519108" cy="2656962"/>
+          </a:xfrm>
+        </p:spPr>
+      </p:pic>
     </p:spTree>
     <p:extLst>
       <p:ext uri="{BB962C8B-B14F-4D97-AF65-F5344CB8AC3E}">
         <p14:creationId xmlns:p14="http://schemas.microsoft.com/office/powerpoint/2010/main" val="977175338"/>
+      </p:ext>
+    </p:extLst>
+  </p:cSld>
+  <p:clrMapOvr>
+    <a:masterClrMapping/>
+  </p:clrMapOvr>
+</p:sld>
+</file>
+
+<file path=ppt/slides/slide13.xml><?xml version="1.0" encoding="utf-8"?>
+<p:sld xmlns:a="http://schemas.openxmlformats.org/drawingml/2006/main" xmlns:r="http://schemas.openxmlformats.org/officeDocument/2006/relationships" xmlns:p="http://schemas.openxmlformats.org/presentationml/2006/main">
+  <p:cSld>
+    <p:spTree>
+      <p:nvGrpSpPr>
+        <p:cNvPr id="1" name=""/>
+        <p:cNvGrpSpPr/>
+        <p:nvPr/>
+      </p:nvGrpSpPr>
+      <p:grpSpPr>
+        <a:xfrm>
+          <a:off x="0" y="0"/>
+          <a:ext cx="0" cy="0"/>
+          <a:chOff x="0" y="0"/>
+          <a:chExt cx="0" cy="0"/>
+        </a:xfrm>
+      </p:grpSpPr>
+      <p:sp>
+        <p:nvSpPr>
+          <p:cNvPr id="4" name="Espace réservé du numéro de diapositive 3">
+            <a:extLst>
+              <a:ext uri="{FF2B5EF4-FFF2-40B4-BE49-F238E27FC236}">
+                <a16:creationId xmlns:a16="http://schemas.microsoft.com/office/drawing/2014/main" id="{4D425635-3014-9650-DF9F-B0BC0275E227}"/>
+              </a:ext>
+            </a:extLst>
+          </p:cNvPr>
+          <p:cNvSpPr>
+            <a:spLocks noGrp="1"/>
+          </p:cNvSpPr>
+          <p:nvPr>
+            <p:ph type="sldNum" sz="quarter" idx="12"/>
+          </p:nvPr>
+        </p:nvSpPr>
+        <p:spPr/>
+        <p:txBody>
+          <a:bodyPr/>
+          <a:lstStyle/>
+          <a:p>
+            <a:fld id="{7A576E13-A1CA-3747-80EE-E6E0D12CE74D}" type="slidenum">
+              <a:rPr lang="fr-FR" smtClean="0"/>
+              <a:t>13</a:t>
+            </a:fld>
+            <a:endParaRPr lang="fr-FR"/>
+          </a:p>
+        </p:txBody>
+      </p:sp>
+      <p:sp>
+        <p:nvSpPr>
+          <p:cNvPr id="5" name="ZoneTexte 4">
+            <a:extLst>
+              <a:ext uri="{FF2B5EF4-FFF2-40B4-BE49-F238E27FC236}">
+                <a16:creationId xmlns:a16="http://schemas.microsoft.com/office/drawing/2014/main" id="{4F5E288C-34F9-08DC-21C4-F9F11D478BEA}"/>
+              </a:ext>
+            </a:extLst>
+          </p:cNvPr>
+          <p:cNvSpPr txBox="1"/>
+          <p:nvPr/>
+        </p:nvSpPr>
+        <p:spPr>
+          <a:xfrm>
+            <a:off x="1426285" y="2201954"/>
+            <a:ext cx="7184315" cy="1569660"/>
+          </a:xfrm>
+          <a:prstGeom prst="rect">
+            <a:avLst/>
+          </a:prstGeom>
+          <a:noFill/>
+        </p:spPr>
+        <p:txBody>
+          <a:bodyPr wrap="square" rtlCol="0">
+            <a:spAutoFit/>
+          </a:bodyPr>
+          <a:lstStyle/>
+          <a:p>
+            <a:r>
+              <a:rPr lang="fr-FR" sz="9600" dirty="0"/>
+              <a:t>Des questions</a:t>
+            </a:r>
+          </a:p>
+        </p:txBody>
+      </p:sp>
+      <p:pic>
+        <p:nvPicPr>
+          <p:cNvPr id="7" name="Image 6">
+            <a:extLst>
+              <a:ext uri="{FF2B5EF4-FFF2-40B4-BE49-F238E27FC236}">
+                <a16:creationId xmlns:a16="http://schemas.microsoft.com/office/drawing/2014/main" id="{6DCCF659-DD66-572D-196B-EB6A45FA01E8}"/>
+              </a:ext>
+            </a:extLst>
+          </p:cNvPr>
+          <p:cNvPicPr>
+            <a:picLocks noChangeAspect="1"/>
+          </p:cNvPicPr>
+          <p:nvPr/>
+        </p:nvPicPr>
+        <p:blipFill>
+          <a:blip r:embed="rId2"/>
+          <a:stretch>
+            <a:fillRect/>
+          </a:stretch>
+        </p:blipFill>
+        <p:spPr>
+          <a:xfrm>
+            <a:off x="9113822" y="1859340"/>
+            <a:ext cx="1736756" cy="2254888"/>
+          </a:xfrm>
+          <a:prstGeom prst="rect">
+            <a:avLst/>
+          </a:prstGeom>
+        </p:spPr>
+      </p:pic>
+    </p:spTree>
+    <p:extLst>
+      <p:ext uri="{BB962C8B-B14F-4D97-AF65-F5344CB8AC3E}">
+        <p14:creationId xmlns:p14="http://schemas.microsoft.com/office/powerpoint/2010/main" val="1312113141"/>
       </p:ext>
     </p:extLst>
   </p:cSld>
@@ -4155,6 +4508,14 @@
         <p:txBody>
           <a:bodyPr/>
           <a:lstStyle/>
+          <a:p>
+            <a:r>
+              <a:rPr lang="fr-FR" dirty="0">
+                <a:latin typeface="Century Gothic" panose="020B0502020202020204" pitchFamily="34" charset="0"/>
+              </a:rPr>
+              <a:t>Problématique</a:t>
+            </a:r>
+          </a:p>
           <a:p>
             <a:r>
               <a:rPr lang="fr-FR" dirty="0">
@@ -4730,7 +5091,7 @@
         </p:blipFill>
         <p:spPr>
           <a:xfrm>
-            <a:off x="8987834" y="2118823"/>
+            <a:off x="8106773" y="2118824"/>
             <a:ext cx="2530121" cy="2435688"/>
           </a:xfrm>
         </p:spPr>
@@ -4757,7 +5118,7 @@
         </p:blipFill>
         <p:spPr>
           <a:xfrm>
-            <a:off x="3747077" y="2118822"/>
+            <a:off x="2866016" y="2118823"/>
             <a:ext cx="4697846" cy="2620354"/>
           </a:xfrm>
           <a:prstGeom prst="rect">
@@ -4779,7 +5140,7 @@
         </p:nvSpPr>
         <p:spPr>
           <a:xfrm>
-            <a:off x="5287383" y="4554510"/>
+            <a:off x="4406322" y="4554511"/>
             <a:ext cx="1617233" cy="369332"/>
           </a:xfrm>
           <a:prstGeom prst="rect">
@@ -4814,7 +5175,7 @@
         </p:nvSpPr>
         <p:spPr>
           <a:xfrm>
-            <a:off x="9505237" y="4554510"/>
+            <a:off x="8624176" y="4554511"/>
             <a:ext cx="1495313" cy="369332"/>
           </a:xfrm>
           <a:prstGeom prst="rect">
@@ -4857,7 +5218,7 @@
         </p:blipFill>
         <p:spPr>
           <a:xfrm>
-            <a:off x="1461077" y="2489199"/>
+            <a:off x="580016" y="2489200"/>
             <a:ext cx="2286000" cy="1879600"/>
           </a:xfrm>
           <a:prstGeom prst="rect">
@@ -4879,7 +5240,7 @@
         </p:nvSpPr>
         <p:spPr>
           <a:xfrm>
-            <a:off x="1728743" y="4554510"/>
+            <a:off x="847682" y="4554511"/>
             <a:ext cx="1750668" cy="369332"/>
           </a:xfrm>
           <a:prstGeom prst="rect">
@@ -4926,6 +5287,161 @@
               <a:t>4</a:t>
             </a:fld>
             <a:endParaRPr lang="fr-FR"/>
+          </a:p>
+        </p:txBody>
+      </p:sp>
+      <p:pic>
+        <p:nvPicPr>
+          <p:cNvPr id="11" name="Image 10">
+            <a:extLst>
+              <a:ext uri="{FF2B5EF4-FFF2-40B4-BE49-F238E27FC236}">
+                <a16:creationId xmlns:a16="http://schemas.microsoft.com/office/drawing/2014/main" id="{A7CBA1CF-4592-13A4-A6BF-9364D62CDA9C}"/>
+              </a:ext>
+            </a:extLst>
+          </p:cNvPr>
+          <p:cNvPicPr>
+            <a:picLocks noChangeAspect="1"/>
+          </p:cNvPicPr>
+          <p:nvPr/>
+        </p:nvPicPr>
+        <p:blipFill>
+          <a:blip r:embed="rId5"/>
+          <a:stretch>
+            <a:fillRect/>
+          </a:stretch>
+        </p:blipFill>
+        <p:spPr>
+          <a:xfrm>
+            <a:off x="10226944" y="2401409"/>
+            <a:ext cx="707827" cy="707827"/>
+          </a:xfrm>
+          <a:prstGeom prst="rect">
+            <a:avLst/>
+          </a:prstGeom>
+        </p:spPr>
+      </p:pic>
+      <p:pic>
+        <p:nvPicPr>
+          <p:cNvPr id="13" name="Image 12">
+            <a:extLst>
+              <a:ext uri="{FF2B5EF4-FFF2-40B4-BE49-F238E27FC236}">
+                <a16:creationId xmlns:a16="http://schemas.microsoft.com/office/drawing/2014/main" id="{5FEE3221-7C25-7672-3E96-BF72F681B3D1}"/>
+              </a:ext>
+            </a:extLst>
+          </p:cNvPr>
+          <p:cNvPicPr>
+            <a:picLocks noChangeAspect="1"/>
+          </p:cNvPicPr>
+          <p:nvPr/>
+        </p:nvPicPr>
+        <p:blipFill>
+          <a:blip r:embed="rId6"/>
+          <a:stretch>
+            <a:fillRect/>
+          </a:stretch>
+        </p:blipFill>
+        <p:spPr>
+          <a:xfrm>
+            <a:off x="10226944" y="3336668"/>
+            <a:ext cx="707827" cy="707827"/>
+          </a:xfrm>
+          <a:prstGeom prst="rect">
+            <a:avLst/>
+          </a:prstGeom>
+        </p:spPr>
+      </p:pic>
+      <p:pic>
+        <p:nvPicPr>
+          <p:cNvPr id="15" name="Image 14">
+            <a:extLst>
+              <a:ext uri="{FF2B5EF4-FFF2-40B4-BE49-F238E27FC236}">
+                <a16:creationId xmlns:a16="http://schemas.microsoft.com/office/drawing/2014/main" id="{BBBB1683-9E4A-AEAB-6FB1-7FC5AAC7D7DC}"/>
+              </a:ext>
+            </a:extLst>
+          </p:cNvPr>
+          <p:cNvPicPr>
+            <a:picLocks noChangeAspect="1"/>
+          </p:cNvPicPr>
+          <p:nvPr/>
+        </p:nvPicPr>
+        <p:blipFill>
+          <a:blip r:embed="rId7"/>
+          <a:stretch>
+            <a:fillRect/>
+          </a:stretch>
+        </p:blipFill>
+        <p:spPr>
+          <a:xfrm>
+            <a:off x="6023555" y="2489200"/>
+            <a:ext cx="683559" cy="683559"/>
+          </a:xfrm>
+          <a:prstGeom prst="rect">
+            <a:avLst/>
+          </a:prstGeom>
+        </p:spPr>
+      </p:pic>
+      <p:pic>
+        <p:nvPicPr>
+          <p:cNvPr id="19" name="Image 18">
+            <a:extLst>
+              <a:ext uri="{FF2B5EF4-FFF2-40B4-BE49-F238E27FC236}">
+                <a16:creationId xmlns:a16="http://schemas.microsoft.com/office/drawing/2014/main" id="{599FADC5-FFA2-3792-DF4F-4F5B408DA181}"/>
+              </a:ext>
+            </a:extLst>
+          </p:cNvPr>
+          <p:cNvPicPr>
+            <a:picLocks noChangeAspect="1"/>
+          </p:cNvPicPr>
+          <p:nvPr/>
+        </p:nvPicPr>
+        <p:blipFill>
+          <a:blip r:embed="rId8"/>
+          <a:stretch>
+            <a:fillRect/>
+          </a:stretch>
+        </p:blipFill>
+        <p:spPr>
+          <a:xfrm>
+            <a:off x="2182457" y="2489200"/>
+            <a:ext cx="683559" cy="683559"/>
+          </a:xfrm>
+          <a:prstGeom prst="rect">
+            <a:avLst/>
+          </a:prstGeom>
+        </p:spPr>
+      </p:pic>
+      <p:sp>
+        <p:nvSpPr>
+          <p:cNvPr id="20" name="ZoneTexte 19">
+            <a:extLst>
+              <a:ext uri="{FF2B5EF4-FFF2-40B4-BE49-F238E27FC236}">
+                <a16:creationId xmlns:a16="http://schemas.microsoft.com/office/drawing/2014/main" id="{0E9AB71A-75AF-EC97-88A0-40EB0EBA4B02}"/>
+              </a:ext>
+            </a:extLst>
+          </p:cNvPr>
+          <p:cNvSpPr txBox="1"/>
+          <p:nvPr/>
+        </p:nvSpPr>
+        <p:spPr>
+          <a:xfrm>
+            <a:off x="-55961" y="6631240"/>
+            <a:ext cx="1807285" cy="246221"/>
+          </a:xfrm>
+          <a:prstGeom prst="rect">
+            <a:avLst/>
+          </a:prstGeom>
+          <a:noFill/>
+        </p:spPr>
+        <p:txBody>
+          <a:bodyPr wrap="square" rtlCol="0">
+            <a:spAutoFit/>
+          </a:bodyPr>
+          <a:lstStyle/>
+          <a:p>
+            <a:r>
+              <a:rPr lang="fr-FR" sz="1000" dirty="0"/>
+              <a:t>*images non contractuelle</a:t>
+            </a:r>
           </a:p>
         </p:txBody>
       </p:sp>
@@ -5151,7 +5667,12 @@
             <p:ph type="title"/>
           </p:nvPr>
         </p:nvSpPr>
-        <p:spPr/>
+        <p:spPr>
+          <a:xfrm>
+            <a:off x="-107576" y="-371824"/>
+            <a:ext cx="10515600" cy="1325563"/>
+          </a:xfrm>
+        </p:spPr>
         <p:txBody>
           <a:bodyPr/>
           <a:lstStyle/>
@@ -5187,8 +5708,8 @@
         </p:blipFill>
         <p:spPr>
           <a:xfrm>
-            <a:off x="2926080" y="1449107"/>
-            <a:ext cx="6074274" cy="5140526"/>
+            <a:off x="2194559" y="542884"/>
+            <a:ext cx="7462222" cy="6315116"/>
           </a:xfrm>
         </p:spPr>
       </p:pic>
@@ -5267,7 +5788,12 @@
             <p:ph type="title"/>
           </p:nvPr>
         </p:nvSpPr>
-        <p:spPr/>
+        <p:spPr>
+          <a:xfrm>
+            <a:off x="-86062" y="-413055"/>
+            <a:ext cx="10515600" cy="1325563"/>
+          </a:xfrm>
+        </p:spPr>
         <p:txBody>
           <a:bodyPr/>
           <a:lstStyle/>
@@ -5332,8 +5858,8 @@
         </p:blipFill>
         <p:spPr>
           <a:xfrm>
-            <a:off x="1263711" y="1328809"/>
-            <a:ext cx="8718489" cy="5210103"/>
+            <a:off x="666078" y="623944"/>
+            <a:ext cx="10431953" cy="6234056"/>
           </a:xfrm>
         </p:spPr>
       </p:pic>
@@ -5383,7 +5909,12 @@
             <p:ph type="title"/>
           </p:nvPr>
         </p:nvSpPr>
-        <p:spPr/>
+        <p:spPr>
+          <a:xfrm>
+            <a:off x="-107576" y="-422808"/>
+            <a:ext cx="10515600" cy="1325563"/>
+          </a:xfrm>
+        </p:spPr>
         <p:txBody>
           <a:bodyPr/>
           <a:lstStyle/>
@@ -5419,8 +5950,8 @@
         </p:blipFill>
         <p:spPr>
           <a:xfrm>
-            <a:off x="2850777" y="1433892"/>
-            <a:ext cx="5592112" cy="5184134"/>
+            <a:off x="2592593" y="534611"/>
+            <a:ext cx="6820348" cy="6322763"/>
           </a:xfrm>
         </p:spPr>
       </p:pic>
@@ -5499,7 +6030,12 @@
             <p:ph type="title"/>
           </p:nvPr>
         </p:nvSpPr>
-        <p:spPr/>
+        <p:spPr>
+          <a:xfrm>
+            <a:off x="-108473" y="-387910"/>
+            <a:ext cx="10515600" cy="1325563"/>
+          </a:xfrm>
+        </p:spPr>
         <p:txBody>
           <a:bodyPr/>
           <a:lstStyle/>
@@ -5535,8 +6071,8 @@
         </p:blipFill>
         <p:spPr>
           <a:xfrm>
-            <a:off x="1264585" y="1825625"/>
-            <a:ext cx="9662830" cy="4351338"/>
+            <a:off x="435974" y="937653"/>
+            <a:ext cx="11136900" cy="5015137"/>
           </a:xfrm>
         </p:spPr>
       </p:pic>

</xml_diff>